<commit_message>
Modified presentation slodes, added Online Collab link and added Presentation Headings and Time.txt :qw
</commit_message>
<xml_diff>
--- a/Final presentation.pptx
+++ b/Final presentation.pptx
@@ -5,7 +5,7 @@
     <p:sldMasterId id="2147483684" r:id="rId2"/>
   </p:sldMasterIdLst>
   <p:notesMasterIdLst>
-    <p:notesMasterId r:id="rId11"/>
+    <p:notesMasterId r:id="rId9"/>
   </p:notesMasterIdLst>
   <p:sldIdLst>
     <p:sldId id="272" r:id="rId3"/>
@@ -14,8 +14,6 @@
     <p:sldId id="275" r:id="rId6"/>
     <p:sldId id="276" r:id="rId7"/>
     <p:sldId id="277" r:id="rId8"/>
-    <p:sldId id="278" r:id="rId9"/>
-    <p:sldId id="279" r:id="rId10"/>
   </p:sldIdLst>
   <p:sldSz cx="12192000" cy="6858000"/>
   <p:notesSz cx="6858000" cy="9144000"/>
@@ -204,7 +202,7 @@
           <a:p>
             <a:fld id="{71BD4573-58E7-4156-A133-2731F5F8D1A6}" type="datetimeFigureOut">
               <a:rPr lang="en-US" smtClean="0"/>
-              <a:t>4/18/2017</a:t>
+              <a:t>4/19/2017</a:t>
             </a:fld>
             <a:endParaRPr lang="en-US"/>
           </a:p>
@@ -268,38 +266,37 @@
           <a:p>
             <a:pPr lvl="0"/>
             <a:r>
-              <a:rPr lang="en-US" smtClean="0"/>
+              <a:rPr lang="en-US"/>
               <a:t>Click to edit Master text styles</a:t>
             </a:r>
           </a:p>
           <a:p>
             <a:pPr lvl="1"/>
             <a:r>
-              <a:rPr lang="en-US" smtClean="0"/>
+              <a:rPr lang="en-US"/>
               <a:t>Second level</a:t>
             </a:r>
           </a:p>
           <a:p>
             <a:pPr lvl="2"/>
             <a:r>
-              <a:rPr lang="en-US" smtClean="0"/>
+              <a:rPr lang="en-US"/>
               <a:t>Third level</a:t>
             </a:r>
           </a:p>
           <a:p>
             <a:pPr lvl="3"/>
             <a:r>
-              <a:rPr lang="en-US" smtClean="0"/>
+              <a:rPr lang="en-US"/>
               <a:t>Fourth level</a:t>
             </a:r>
           </a:p>
           <a:p>
             <a:pPr lvl="4"/>
             <a:r>
-              <a:rPr lang="en-US" smtClean="0"/>
+              <a:rPr lang="en-US"/>
               <a:t>Fifth level</a:t>
             </a:r>
-            <a:endParaRPr lang="en-US"/>
           </a:p>
         </p:txBody>
       </p:sp>
@@ -595,7 +592,7 @@
           <a:p>
             <a:fld id="{021A1D30-C0A0-4124-A783-34D9F15FA0FE}" type="datetime1">
               <a:rPr lang="en-US" smtClean="0"/>
-              <a:t>4/18/2017</a:t>
+              <a:t>4/19/2017</a:t>
             </a:fld>
             <a:endParaRPr lang="en-US"/>
           </a:p>
@@ -697,10 +694,9 @@
           </a:lstStyle>
           <a:p>
             <a:r>
-              <a:rPr kumimoji="0" lang="en-US" smtClean="0"/>
+              <a:rPr kumimoji="0" lang="en-US"/>
               <a:t>Click to edit Master subtitle style</a:t>
             </a:r>
-            <a:endParaRPr kumimoji="0" lang="en-US"/>
           </a:p>
         </p:txBody>
       </p:sp>
@@ -761,7 +757,7 @@
           </a:lstStyle>
           <a:p>
             <a:r>
-              <a:rPr kumimoji="0" lang="en-US" smtClean="0"/>
+              <a:rPr kumimoji="0" lang="en-US"/>
               <a:t>Click to edit Master title style</a:t>
             </a:r>
             <a:endParaRPr kumimoji="0" lang="en-US" dirty="0"/>
@@ -978,7 +974,7 @@
           <a:p>
             <a:fld id="{8D2D5871-AB0F-4B3D-8861-97E78CB7B47E}" type="datetime1">
               <a:rPr lang="en-US" smtClean="0"/>
-              <a:t>4/18/2017</a:t>
+              <a:t>4/19/2017</a:t>
             </a:fld>
             <a:endParaRPr lang="en-US"/>
           </a:p>
@@ -1043,35 +1039,35 @@
           <a:p>
             <a:pPr lvl="0" eaLnBrk="1" latinLnBrk="0" hangingPunct="1"/>
             <a:r>
-              <a:rPr lang="en-US" smtClean="0"/>
+              <a:rPr lang="en-US"/>
               <a:t>Edit Master text styles</a:t>
             </a:r>
           </a:p>
           <a:p>
             <a:pPr lvl="1" eaLnBrk="1" latinLnBrk="0" hangingPunct="1"/>
             <a:r>
-              <a:rPr lang="en-US" smtClean="0"/>
+              <a:rPr lang="en-US"/>
               <a:t>Second level</a:t>
             </a:r>
           </a:p>
           <a:p>
             <a:pPr lvl="2" eaLnBrk="1" latinLnBrk="0" hangingPunct="1"/>
             <a:r>
-              <a:rPr lang="en-US" smtClean="0"/>
+              <a:rPr lang="en-US"/>
               <a:t>Third level</a:t>
             </a:r>
           </a:p>
           <a:p>
             <a:pPr lvl="3" eaLnBrk="1" latinLnBrk="0" hangingPunct="1"/>
             <a:r>
-              <a:rPr lang="en-US" smtClean="0"/>
+              <a:rPr lang="en-US"/>
               <a:t>Fourth level</a:t>
             </a:r>
           </a:p>
           <a:p>
             <a:pPr lvl="4" eaLnBrk="1" latinLnBrk="0" hangingPunct="1"/>
             <a:r>
-              <a:rPr lang="en-US" smtClean="0"/>
+              <a:rPr lang="en-US"/>
               <a:t>Fifth level</a:t>
             </a:r>
             <a:endParaRPr kumimoji="0" lang="en-US"/>
@@ -1094,10 +1090,9 @@
           <a:lstStyle/>
           <a:p>
             <a:r>
-              <a:rPr kumimoji="0" lang="en-US" smtClean="0"/>
+              <a:rPr kumimoji="0" lang="en-US"/>
               <a:t>Click to edit Master title style</a:t>
             </a:r>
-            <a:endParaRPr kumimoji="0" lang="en-US"/>
           </a:p>
         </p:txBody>
       </p:sp>
@@ -1160,7 +1155,7 @@
           <a:p>
             <a:fld id="{14418406-4C3F-4F3E-80BD-A22568EA37EB}" type="datetime1">
               <a:rPr lang="en-US" smtClean="0"/>
-              <a:t>4/18/2017</a:t>
+              <a:t>4/19/2017</a:t>
             </a:fld>
             <a:endParaRPr lang="en-US"/>
           </a:p>
@@ -1230,35 +1225,35 @@
           <a:p>
             <a:pPr lvl="0" eaLnBrk="1" latinLnBrk="0" hangingPunct="1"/>
             <a:r>
-              <a:rPr lang="en-US" smtClean="0"/>
+              <a:rPr lang="en-US"/>
               <a:t>Edit Master text styles</a:t>
             </a:r>
           </a:p>
           <a:p>
             <a:pPr lvl="1" eaLnBrk="1" latinLnBrk="0" hangingPunct="1"/>
             <a:r>
-              <a:rPr lang="en-US" smtClean="0"/>
+              <a:rPr lang="en-US"/>
               <a:t>Second level</a:t>
             </a:r>
           </a:p>
           <a:p>
             <a:pPr lvl="2" eaLnBrk="1" latinLnBrk="0" hangingPunct="1"/>
             <a:r>
-              <a:rPr lang="en-US" smtClean="0"/>
+              <a:rPr lang="en-US"/>
               <a:t>Third level</a:t>
             </a:r>
           </a:p>
           <a:p>
             <a:pPr lvl="3" eaLnBrk="1" latinLnBrk="0" hangingPunct="1"/>
             <a:r>
-              <a:rPr lang="en-US" smtClean="0"/>
+              <a:rPr lang="en-US"/>
               <a:t>Fourth level</a:t>
             </a:r>
           </a:p>
           <a:p>
             <a:pPr lvl="4" eaLnBrk="1" latinLnBrk="0" hangingPunct="1"/>
             <a:r>
-              <a:rPr lang="en-US" smtClean="0"/>
+              <a:rPr lang="en-US"/>
               <a:t>Fifth level</a:t>
             </a:r>
             <a:endParaRPr kumimoji="0" lang="en-US"/>
@@ -1286,10 +1281,9 @@
           <a:lstStyle/>
           <a:p>
             <a:r>
-              <a:rPr kumimoji="0" lang="en-US" smtClean="0"/>
+              <a:rPr kumimoji="0" lang="en-US"/>
               <a:t>Click to edit Master title style</a:t>
             </a:r>
-            <a:endParaRPr kumimoji="0" lang="en-US"/>
           </a:p>
         </p:txBody>
       </p:sp>
@@ -1352,7 +1346,7 @@
           <a:p>
             <a:fld id="{65F28077-7188-48C5-8679-2287FAC952E9}" type="datetime1">
               <a:rPr lang="en-US" smtClean="0"/>
-              <a:t>4/18/2017</a:t>
+              <a:t>4/19/2017</a:t>
             </a:fld>
             <a:endParaRPr lang="en-US"/>
           </a:p>
@@ -1417,35 +1411,35 @@
           <a:p>
             <a:pPr lvl="0" eaLnBrk="1" latinLnBrk="0" hangingPunct="1"/>
             <a:r>
-              <a:rPr lang="en-US" smtClean="0"/>
+              <a:rPr lang="en-US"/>
               <a:t>Edit Master text styles</a:t>
             </a:r>
           </a:p>
           <a:p>
             <a:pPr lvl="1" eaLnBrk="1" latinLnBrk="0" hangingPunct="1"/>
             <a:r>
-              <a:rPr lang="en-US" smtClean="0"/>
+              <a:rPr lang="en-US"/>
               <a:t>Second level</a:t>
             </a:r>
           </a:p>
           <a:p>
             <a:pPr lvl="2" eaLnBrk="1" latinLnBrk="0" hangingPunct="1"/>
             <a:r>
-              <a:rPr lang="en-US" smtClean="0"/>
+              <a:rPr lang="en-US"/>
               <a:t>Third level</a:t>
             </a:r>
           </a:p>
           <a:p>
             <a:pPr lvl="3" eaLnBrk="1" latinLnBrk="0" hangingPunct="1"/>
             <a:r>
-              <a:rPr lang="en-US" smtClean="0"/>
+              <a:rPr lang="en-US"/>
               <a:t>Fourth level</a:t>
             </a:r>
           </a:p>
           <a:p>
             <a:pPr lvl="4" eaLnBrk="1" latinLnBrk="0" hangingPunct="1"/>
             <a:r>
-              <a:rPr lang="en-US" smtClean="0"/>
+              <a:rPr lang="en-US"/>
               <a:t>Fifth level</a:t>
             </a:r>
             <a:endParaRPr kumimoji="0" lang="en-US"/>
@@ -1468,10 +1462,9 @@
           <a:lstStyle/>
           <a:p>
             <a:r>
-              <a:rPr kumimoji="0" lang="en-US" smtClean="0"/>
+              <a:rPr kumimoji="0" lang="en-US"/>
               <a:t>Click to edit Master title style</a:t>
             </a:r>
-            <a:endParaRPr kumimoji="0" lang="en-US"/>
           </a:p>
         </p:txBody>
       </p:sp>
@@ -1534,7 +1527,7 @@
           <a:p>
             <a:fld id="{D2DCB740-6776-4EE9-99FD-96D592FA5A23}" type="datetime1">
               <a:rPr lang="en-US" smtClean="0"/>
-              <a:t>4/18/2017</a:t>
+              <a:t>4/19/2017</a:t>
             </a:fld>
             <a:endParaRPr lang="en-US"/>
           </a:p>
@@ -1653,7 +1646,7 @@
           <a:p>
             <a:pPr lvl="0" eaLnBrk="1" latinLnBrk="0" hangingPunct="1"/>
             <a:r>
-              <a:rPr kumimoji="0" lang="en-US" smtClean="0"/>
+              <a:rPr kumimoji="0" lang="en-US"/>
               <a:t>Edit Master text styles</a:t>
             </a:r>
           </a:p>
@@ -1713,10 +1706,9 @@
           </a:lstStyle>
           <a:p>
             <a:r>
-              <a:rPr kumimoji="0" lang="en-US" smtClean="0"/>
+              <a:rPr kumimoji="0" lang="en-US"/>
               <a:t>Click to edit Master title style</a:t>
             </a:r>
-            <a:endParaRPr kumimoji="0" lang="en-US"/>
           </a:p>
         </p:txBody>
       </p:sp>
@@ -1779,7 +1771,7 @@
           <a:p>
             <a:fld id="{05F6BD99-6FFD-46C5-B5E2-43A34BDA2566}" type="datetime1">
               <a:rPr lang="en-US" smtClean="0"/>
-              <a:t>4/18/2017</a:t>
+              <a:t>4/19/2017</a:t>
             </a:fld>
             <a:endParaRPr lang="en-US"/>
           </a:p>
@@ -1865,35 +1857,35 @@
           <a:p>
             <a:pPr lvl="0" eaLnBrk="1" latinLnBrk="0" hangingPunct="1"/>
             <a:r>
-              <a:rPr lang="en-US" smtClean="0"/>
+              <a:rPr lang="en-US"/>
               <a:t>Edit Master text styles</a:t>
             </a:r>
           </a:p>
           <a:p>
             <a:pPr lvl="1" eaLnBrk="1" latinLnBrk="0" hangingPunct="1"/>
             <a:r>
-              <a:rPr lang="en-US" smtClean="0"/>
+              <a:rPr lang="en-US"/>
               <a:t>Second level</a:t>
             </a:r>
           </a:p>
           <a:p>
             <a:pPr lvl="2" eaLnBrk="1" latinLnBrk="0" hangingPunct="1"/>
             <a:r>
-              <a:rPr lang="en-US" smtClean="0"/>
+              <a:rPr lang="en-US"/>
               <a:t>Third level</a:t>
             </a:r>
           </a:p>
           <a:p>
             <a:pPr lvl="3" eaLnBrk="1" latinLnBrk="0" hangingPunct="1"/>
             <a:r>
-              <a:rPr lang="en-US" smtClean="0"/>
+              <a:rPr lang="en-US"/>
               <a:t>Fourth level</a:t>
             </a:r>
           </a:p>
           <a:p>
             <a:pPr lvl="4" eaLnBrk="1" latinLnBrk="0" hangingPunct="1"/>
             <a:r>
-              <a:rPr lang="en-US" smtClean="0"/>
+              <a:rPr lang="en-US"/>
               <a:t>Fifth level</a:t>
             </a:r>
             <a:endParaRPr kumimoji="0" lang="en-US"/>
@@ -1938,35 +1930,35 @@
           <a:p>
             <a:pPr lvl="0" eaLnBrk="1" latinLnBrk="0" hangingPunct="1"/>
             <a:r>
-              <a:rPr lang="en-US" smtClean="0"/>
+              <a:rPr lang="en-US"/>
               <a:t>Edit Master text styles</a:t>
             </a:r>
           </a:p>
           <a:p>
             <a:pPr lvl="1" eaLnBrk="1" latinLnBrk="0" hangingPunct="1"/>
             <a:r>
-              <a:rPr lang="en-US" smtClean="0"/>
+              <a:rPr lang="en-US"/>
               <a:t>Second level</a:t>
             </a:r>
           </a:p>
           <a:p>
             <a:pPr lvl="2" eaLnBrk="1" latinLnBrk="0" hangingPunct="1"/>
             <a:r>
-              <a:rPr lang="en-US" smtClean="0"/>
+              <a:rPr lang="en-US"/>
               <a:t>Third level</a:t>
             </a:r>
           </a:p>
           <a:p>
             <a:pPr lvl="3" eaLnBrk="1" latinLnBrk="0" hangingPunct="1"/>
             <a:r>
-              <a:rPr lang="en-US" smtClean="0"/>
+              <a:rPr lang="en-US"/>
               <a:t>Fourth level</a:t>
             </a:r>
           </a:p>
           <a:p>
             <a:pPr lvl="4" eaLnBrk="1" latinLnBrk="0" hangingPunct="1"/>
             <a:r>
-              <a:rPr lang="en-US" smtClean="0"/>
+              <a:rPr lang="en-US"/>
               <a:t>Fifth level</a:t>
             </a:r>
             <a:endParaRPr kumimoji="0" lang="en-US"/>
@@ -1994,10 +1986,9 @@
           <a:lstStyle/>
           <a:p>
             <a:r>
-              <a:rPr kumimoji="0" lang="en-US" smtClean="0"/>
+              <a:rPr kumimoji="0" lang="en-US"/>
               <a:t>Click to edit Master title style</a:t>
             </a:r>
-            <a:endParaRPr kumimoji="0" lang="en-US"/>
           </a:p>
         </p:txBody>
       </p:sp>
@@ -2060,7 +2051,7 @@
           <a:p>
             <a:fld id="{E022678E-214C-4CF8-97C7-95015FB02960}" type="datetime1">
               <a:rPr lang="en-US" smtClean="0"/>
-              <a:t>4/18/2017</a:t>
+              <a:t>4/19/2017</a:t>
             </a:fld>
             <a:endParaRPr lang="en-US"/>
           </a:p>
@@ -2146,35 +2137,35 @@
           <a:p>
             <a:pPr lvl="0" eaLnBrk="1" latinLnBrk="0" hangingPunct="1"/>
             <a:r>
-              <a:rPr lang="en-US" smtClean="0"/>
+              <a:rPr lang="en-US"/>
               <a:t>Edit Master text styles</a:t>
             </a:r>
           </a:p>
           <a:p>
             <a:pPr lvl="1" eaLnBrk="1" latinLnBrk="0" hangingPunct="1"/>
             <a:r>
-              <a:rPr lang="en-US" smtClean="0"/>
+              <a:rPr lang="en-US"/>
               <a:t>Second level</a:t>
             </a:r>
           </a:p>
           <a:p>
             <a:pPr lvl="2" eaLnBrk="1" latinLnBrk="0" hangingPunct="1"/>
             <a:r>
-              <a:rPr lang="en-US" smtClean="0"/>
+              <a:rPr lang="en-US"/>
               <a:t>Third level</a:t>
             </a:r>
           </a:p>
           <a:p>
             <a:pPr lvl="3" eaLnBrk="1" latinLnBrk="0" hangingPunct="1"/>
             <a:r>
-              <a:rPr lang="en-US" smtClean="0"/>
+              <a:rPr lang="en-US"/>
               <a:t>Fourth level</a:t>
             </a:r>
           </a:p>
           <a:p>
             <a:pPr lvl="4" eaLnBrk="1" latinLnBrk="0" hangingPunct="1"/>
             <a:r>
-              <a:rPr lang="en-US" smtClean="0"/>
+              <a:rPr lang="en-US"/>
               <a:t>Fifth level</a:t>
             </a:r>
             <a:endParaRPr kumimoji="0" lang="en-US"/>
@@ -2229,7 +2220,7 @@
           <a:p>
             <a:pPr lvl="0" eaLnBrk="1" latinLnBrk="0" hangingPunct="1"/>
             <a:r>
-              <a:rPr kumimoji="0" lang="en-US" smtClean="0"/>
+              <a:rPr kumimoji="0" lang="en-US"/>
               <a:t>Edit Master text styles</a:t>
             </a:r>
           </a:p>
@@ -2273,35 +2264,35 @@
           <a:p>
             <a:pPr lvl="0" eaLnBrk="1" latinLnBrk="0" hangingPunct="1"/>
             <a:r>
-              <a:rPr lang="en-US" smtClean="0"/>
+              <a:rPr lang="en-US"/>
               <a:t>Edit Master text styles</a:t>
             </a:r>
           </a:p>
           <a:p>
             <a:pPr lvl="1" eaLnBrk="1" latinLnBrk="0" hangingPunct="1"/>
             <a:r>
-              <a:rPr lang="en-US" smtClean="0"/>
+              <a:rPr lang="en-US"/>
               <a:t>Second level</a:t>
             </a:r>
           </a:p>
           <a:p>
             <a:pPr lvl="2" eaLnBrk="1" latinLnBrk="0" hangingPunct="1"/>
             <a:r>
-              <a:rPr lang="en-US" smtClean="0"/>
+              <a:rPr lang="en-US"/>
               <a:t>Third level</a:t>
             </a:r>
           </a:p>
           <a:p>
             <a:pPr lvl="3" eaLnBrk="1" latinLnBrk="0" hangingPunct="1"/>
             <a:r>
-              <a:rPr lang="en-US" smtClean="0"/>
+              <a:rPr lang="en-US"/>
               <a:t>Fourth level</a:t>
             </a:r>
           </a:p>
           <a:p>
             <a:pPr lvl="4" eaLnBrk="1" latinLnBrk="0" hangingPunct="1"/>
             <a:r>
-              <a:rPr lang="en-US" smtClean="0"/>
+              <a:rPr lang="en-US"/>
               <a:t>Fifth level</a:t>
             </a:r>
             <a:endParaRPr kumimoji="0" lang="en-US"/>
@@ -2358,7 +2349,7 @@
           <a:p>
             <a:pPr lvl="0" eaLnBrk="1" latinLnBrk="0" hangingPunct="1"/>
             <a:r>
-              <a:rPr kumimoji="0" lang="en-US" smtClean="0"/>
+              <a:rPr kumimoji="0" lang="en-US"/>
               <a:t>Edit Master text styles</a:t>
             </a:r>
           </a:p>
@@ -2389,10 +2380,9 @@
           </a:lstStyle>
           <a:p>
             <a:r>
-              <a:rPr kumimoji="0" lang="en-US" smtClean="0"/>
+              <a:rPr kumimoji="0" lang="en-US"/>
               <a:t>Click to edit Master title style</a:t>
             </a:r>
-            <a:endParaRPr kumimoji="0" lang="en-US"/>
           </a:p>
         </p:txBody>
       </p:sp>
@@ -2455,7 +2445,7 @@
           <a:p>
             <a:fld id="{D55660E0-FA77-4473-A859-74127B089143}" type="datetime1">
               <a:rPr lang="en-US" smtClean="0"/>
-              <a:t>4/18/2017</a:t>
+              <a:t>4/19/2017</a:t>
             </a:fld>
             <a:endParaRPr lang="en-US"/>
           </a:p>
@@ -2556,10 +2546,9 @@
           </a:lstStyle>
           <a:p>
             <a:r>
-              <a:rPr kumimoji="0" lang="en-US" smtClean="0"/>
+              <a:rPr kumimoji="0" lang="en-US"/>
               <a:t>Click to edit Master title style</a:t>
             </a:r>
-            <a:endParaRPr kumimoji="0" lang="en-US"/>
           </a:p>
         </p:txBody>
       </p:sp>
@@ -2622,7 +2611,7 @@
           <a:p>
             <a:fld id="{3188D7B8-9F07-4899-827D-5F3CFDDEB574}" type="datetime1">
               <a:rPr lang="en-US" smtClean="0"/>
-              <a:t>4/18/2017</a:t>
+              <a:t>4/19/2017</a:t>
             </a:fld>
             <a:endParaRPr lang="en-US"/>
           </a:p>
@@ -2729,7 +2718,7 @@
           <a:p>
             <a:fld id="{B5197C5C-1CD1-417D-A89C-14747F5222C7}" type="datetime1">
               <a:rPr lang="en-US" smtClean="0"/>
-              <a:t>4/18/2017</a:t>
+              <a:t>4/19/2017</a:t>
             </a:fld>
             <a:endParaRPr lang="en-US"/>
           </a:p>
@@ -2815,35 +2804,35 @@
           <a:p>
             <a:pPr lvl="0" eaLnBrk="1" latinLnBrk="0" hangingPunct="1"/>
             <a:r>
-              <a:rPr lang="en-US" smtClean="0"/>
+              <a:rPr lang="en-US"/>
               <a:t>Edit Master text styles</a:t>
             </a:r>
           </a:p>
           <a:p>
             <a:pPr lvl="1" eaLnBrk="1" latinLnBrk="0" hangingPunct="1"/>
             <a:r>
-              <a:rPr lang="en-US" smtClean="0"/>
+              <a:rPr lang="en-US"/>
               <a:t>Second level</a:t>
             </a:r>
           </a:p>
           <a:p>
             <a:pPr lvl="2" eaLnBrk="1" latinLnBrk="0" hangingPunct="1"/>
             <a:r>
-              <a:rPr lang="en-US" smtClean="0"/>
+              <a:rPr lang="en-US"/>
               <a:t>Third level</a:t>
             </a:r>
           </a:p>
           <a:p>
             <a:pPr lvl="3" eaLnBrk="1" latinLnBrk="0" hangingPunct="1"/>
             <a:r>
-              <a:rPr lang="en-US" smtClean="0"/>
+              <a:rPr lang="en-US"/>
               <a:t>Fourth level</a:t>
             </a:r>
           </a:p>
           <a:p>
             <a:pPr lvl="4" eaLnBrk="1" latinLnBrk="0" hangingPunct="1"/>
             <a:r>
-              <a:rPr lang="en-US" smtClean="0"/>
+              <a:rPr lang="en-US"/>
               <a:t>Fifth level</a:t>
             </a:r>
             <a:endParaRPr kumimoji="0" lang="en-US"/>
@@ -2893,7 +2882,7 @@
           <a:p>
             <a:pPr lvl="0" eaLnBrk="1" latinLnBrk="0" hangingPunct="1"/>
             <a:r>
-              <a:rPr kumimoji="0" lang="en-US" smtClean="0"/>
+              <a:rPr kumimoji="0" lang="en-US"/>
               <a:t>Edit Master text styles</a:t>
             </a:r>
           </a:p>
@@ -2941,10 +2930,9 @@
           </a:lstStyle>
           <a:p>
             <a:r>
-              <a:rPr kumimoji="0" lang="en-US" smtClean="0"/>
+              <a:rPr kumimoji="0" lang="en-US"/>
               <a:t>Click to edit Master title style</a:t>
             </a:r>
-            <a:endParaRPr kumimoji="0" lang="en-US"/>
           </a:p>
         </p:txBody>
       </p:sp>
@@ -3119,7 +3107,7 @@
           <a:p>
             <a:fld id="{1359EFBB-CFA1-4AA8-9123-F0B52DBD84FE}" type="datetime1">
               <a:rPr lang="en-US" smtClean="0"/>
-              <a:t>4/18/2017</a:t>
+              <a:t>4/19/2017</a:t>
             </a:fld>
             <a:endParaRPr lang="en-US"/>
           </a:p>
@@ -3467,7 +3455,7 @@
           </a:lstStyle>
           <a:p>
             <a:r>
-              <a:rPr kumimoji="0" lang="en-US" smtClean="0"/>
+              <a:rPr kumimoji="0" lang="en-US"/>
               <a:t>Click icon to add picture</a:t>
             </a:r>
             <a:endParaRPr kumimoji="0" lang="en-US" dirty="0"/>
@@ -3517,7 +3505,7 @@
           <a:p>
             <a:pPr lvl="0" eaLnBrk="1" latinLnBrk="0" hangingPunct="1"/>
             <a:r>
-              <a:rPr kumimoji="0" lang="en-US" smtClean="0"/>
+              <a:rPr kumimoji="0" lang="en-US"/>
               <a:t>Edit Master text styles</a:t>
             </a:r>
           </a:p>
@@ -3553,10 +3541,9 @@
           </a:lstStyle>
           <a:p>
             <a:r>
-              <a:rPr kumimoji="0" lang="en-US" smtClean="0"/>
+              <a:rPr kumimoji="0" lang="en-US"/>
               <a:t>Click to edit Master title style</a:t>
             </a:r>
-            <a:endParaRPr kumimoji="0" lang="en-US"/>
           </a:p>
         </p:txBody>
       </p:sp>
@@ -4186,7 +4173,7 @@
           <a:p>
             <a:fld id="{61146459-E3C3-4969-9224-5ED50B492D17}" type="datetime1">
               <a:rPr lang="en-US" smtClean="0"/>
-              <a:t>4/18/2017</a:t>
+              <a:t>4/19/2017</a:t>
             </a:fld>
             <a:endParaRPr lang="en-US"/>
           </a:p>
@@ -4294,35 +4281,35 @@
           <a:p>
             <a:pPr lvl="0" eaLnBrk="1" latinLnBrk="0" hangingPunct="1"/>
             <a:r>
-              <a:rPr kumimoji="0" lang="en-US" smtClean="0"/>
+              <a:rPr kumimoji="0" lang="en-US"/>
               <a:t>Edit Master text styles</a:t>
             </a:r>
           </a:p>
           <a:p>
             <a:pPr lvl="1" eaLnBrk="1" latinLnBrk="0" hangingPunct="1"/>
             <a:r>
-              <a:rPr kumimoji="0" lang="en-US" smtClean="0"/>
+              <a:rPr kumimoji="0" lang="en-US"/>
               <a:t>Second level</a:t>
             </a:r>
           </a:p>
           <a:p>
             <a:pPr lvl="2" eaLnBrk="1" latinLnBrk="0" hangingPunct="1"/>
             <a:r>
-              <a:rPr kumimoji="0" lang="en-US" smtClean="0"/>
+              <a:rPr kumimoji="0" lang="en-US"/>
               <a:t>Third level</a:t>
             </a:r>
           </a:p>
           <a:p>
             <a:pPr lvl="3" eaLnBrk="1" latinLnBrk="0" hangingPunct="1"/>
             <a:r>
-              <a:rPr kumimoji="0" lang="en-US" smtClean="0"/>
+              <a:rPr kumimoji="0" lang="en-US"/>
               <a:t>Fourth level</a:t>
             </a:r>
           </a:p>
           <a:p>
             <a:pPr lvl="4" eaLnBrk="1" latinLnBrk="0" hangingPunct="1"/>
             <a:r>
-              <a:rPr kumimoji="0" lang="en-US" smtClean="0"/>
+              <a:rPr kumimoji="0" lang="en-US"/>
               <a:t>Fifth level</a:t>
             </a:r>
             <a:endParaRPr kumimoji="0" lang="en-US" dirty="0"/>
@@ -4355,7 +4342,7 @@
           <a:lstStyle/>
           <a:p>
             <a:r>
-              <a:rPr kumimoji="0" lang="en-US" smtClean="0"/>
+              <a:rPr kumimoji="0" lang="en-US"/>
               <a:t>Click to edit Master title style</a:t>
             </a:r>
             <a:endParaRPr kumimoji="0" lang="en-US" dirty="0"/>
@@ -4395,13 +4382,6 @@
       </p:transition>
     </mc:Fallback>
   </mc:AlternateContent>
-  <p:timing>
-    <p:tnLst>
-      <p:par>
-        <p:cTn id="1" dur="indefinite" restart="never" nodeType="tmRoot"/>
-      </p:par>
-    </p:tnLst>
-  </p:timing>
   <p:hf sldNum="0" hdr="0" ftr="0" dt="0"/>
   <p:txStyles>
     <p:titleStyle>
@@ -4720,56 +4700,88 @@
         <p:spPr>
           <a:xfrm>
             <a:off x="711200" y="3228536"/>
-            <a:ext cx="10472928" cy="2776848"/>
+            <a:ext cx="10472928" cy="2854212"/>
           </a:xfrm>
         </p:spPr>
         <p:txBody>
           <a:bodyPr>
-            <a:normAutofit fontScale="85000" lnSpcReduction="20000"/>
+            <a:normAutofit fontScale="92500" lnSpcReduction="10000"/>
           </a:bodyPr>
           <a:lstStyle/>
           <a:p>
             <a:r>
-              <a:rPr lang="en-US" dirty="0" smtClean="0"/>
-              <a:t>Colin Allen</a:t>
-            </a:r>
-          </a:p>
-          <a:p>
-            <a:r>
-              <a:rPr lang="en-US" dirty="0" smtClean="0"/>
-              <a:t>Keith Feeney</a:t>
-            </a:r>
-          </a:p>
-          <a:p>
-            <a:r>
-              <a:rPr lang="en-US" dirty="0" smtClean="0"/>
-              <a:t>Patrick Lawlor</a:t>
-            </a:r>
-          </a:p>
-          <a:p>
-            <a:r>
-              <a:rPr lang="en-US" dirty="0" smtClean="0"/>
-              <a:t>Fearghal McMorrow</a:t>
-            </a:r>
-          </a:p>
-          <a:p>
-            <a:r>
-              <a:rPr lang="en-US" dirty="0" smtClean="0"/>
-              <a:t>Cedric Vecchionacce</a:t>
-            </a:r>
-          </a:p>
-          <a:p>
-            <a:r>
-              <a:rPr lang="en-US" dirty="0" smtClean="0"/>
-              <a:t>(Group 14)</a:t>
-            </a:r>
-          </a:p>
-          <a:p>
-            <a:endParaRPr lang="en-US" dirty="0"/>
-          </a:p>
-          <a:p>
-            <a:r>
-              <a:rPr lang="en-US" dirty="0" smtClean="0"/>
+              <a:rPr lang="en-IE" dirty="0"/>
+              <a:t>C</a:t>
+            </a:r>
+            <a:r>
+              <a:rPr lang="en-US" dirty="0" err="1"/>
+              <a:t>olin</a:t>
+            </a:r>
+            <a:r>
+              <a:rPr lang="en-US" dirty="0"/>
+              <a:t> Allen</a:t>
+            </a:r>
+          </a:p>
+          <a:p>
+            <a:r>
+              <a:rPr lang="en-IE" dirty="0"/>
+              <a:t>K</a:t>
+            </a:r>
+            <a:r>
+              <a:rPr lang="en-US" dirty="0" err="1"/>
+              <a:t>eith</a:t>
+            </a:r>
+            <a:r>
+              <a:rPr lang="en-US" dirty="0"/>
+              <a:t> Feeney</a:t>
+            </a:r>
+          </a:p>
+          <a:p>
+            <a:r>
+              <a:rPr lang="en-IE" dirty="0"/>
+              <a:t>P</a:t>
+            </a:r>
+            <a:r>
+              <a:rPr lang="en-US" dirty="0" err="1"/>
+              <a:t>atrick</a:t>
+            </a:r>
+            <a:r>
+              <a:rPr lang="en-US" dirty="0"/>
+              <a:t> Lawlor</a:t>
+            </a:r>
+          </a:p>
+          <a:p>
+            <a:r>
+              <a:rPr lang="en-IE" dirty="0" err="1"/>
+              <a:t>Fearghal</a:t>
+            </a:r>
+            <a:r>
+              <a:rPr lang="en-IE" dirty="0"/>
+              <a:t> </a:t>
+            </a:r>
+            <a:r>
+              <a:rPr lang="en-IE" dirty="0" err="1"/>
+              <a:t>McMorrow</a:t>
+            </a:r>
+            <a:endParaRPr lang="en-IE" dirty="0"/>
+          </a:p>
+          <a:p>
+            <a:r>
+              <a:rPr lang="en-IE" dirty="0"/>
+              <a:t>Cedric </a:t>
+            </a:r>
+            <a:r>
+              <a:rPr lang="en-IE" dirty="0" err="1"/>
+              <a:t>Vecchionacce</a:t>
+            </a:r>
+            <a:endParaRPr lang="en-IE" dirty="0"/>
+          </a:p>
+          <a:p>
+            <a:endParaRPr lang="en-IE" dirty="0"/>
+          </a:p>
+          <a:p>
+            <a:r>
+              <a:rPr lang="en-IE" dirty="0"/>
               <a:t>25 April 2017</a:t>
             </a:r>
             <a:endParaRPr lang="en-US" dirty="0"/>
@@ -4795,10 +4807,9 @@
           <a:lstStyle/>
           <a:p>
             <a:r>
-              <a:rPr lang="en-US" dirty="0" smtClean="0"/>
-              <a:t>Audio Acoustic Assistant</a:t>
-            </a:r>
-            <a:endParaRPr lang="en-US" dirty="0"/>
+              <a:rPr lang="en-US" dirty="0"/>
+              <a:t>Audio Acoustic Assistant </a:t>
+            </a:r>
           </a:p>
         </p:txBody>
       </p:sp>
@@ -4824,13 +4835,6 @@
       </p:transition>
     </mc:Fallback>
   </mc:AlternateContent>
-  <p:timing>
-    <p:tnLst>
-      <p:par>
-        <p:cTn id="1" dur="indefinite" restart="never" nodeType="tmRoot"/>
-      </p:par>
-    </p:tnLst>
-  </p:timing>
 </p:sld>
 </file>
 
@@ -4861,159 +4865,82 @@
             <p:ph idx="1"/>
           </p:nvPr>
         </p:nvSpPr>
-        <p:spPr/>
-        <p:txBody>
-          <a:bodyPr>
-            <a:normAutofit/>
-          </a:bodyPr>
-          <a:lstStyle/>
-          <a:p>
-            <a:r>
-              <a:rPr lang="en-US" dirty="0" smtClean="0"/>
-              <a:t>From start to mid-point presentation</a:t>
-            </a:r>
-          </a:p>
-          <a:p>
-            <a:pPr lvl="1"/>
-            <a:r>
-              <a:rPr lang="en-US" dirty="0" smtClean="0"/>
-              <a:t>Why? </a:t>
-            </a:r>
-          </a:p>
-          <a:p>
-            <a:pPr lvl="2"/>
-            <a:r>
-              <a:rPr lang="en-US" dirty="0" smtClean="0"/>
-              <a:t>History of idea</a:t>
-            </a:r>
-          </a:p>
-          <a:p>
-            <a:pPr lvl="2"/>
-            <a:r>
-              <a:rPr lang="en-US" dirty="0" smtClean="0"/>
-              <a:t>Web Application</a:t>
-            </a:r>
-          </a:p>
-          <a:p>
-            <a:pPr lvl="1"/>
-            <a:r>
-              <a:rPr lang="en-US" dirty="0" smtClean="0"/>
-              <a:t>Proposal</a:t>
-            </a:r>
-          </a:p>
-          <a:p>
-            <a:pPr lvl="1"/>
-            <a:r>
-              <a:rPr lang="en-US" dirty="0" smtClean="0"/>
-              <a:t>Requirements Specification</a:t>
-            </a:r>
-          </a:p>
-          <a:p>
-            <a:pPr lvl="2"/>
-            <a:r>
-              <a:rPr lang="en-US" dirty="0" smtClean="0"/>
-              <a:t>Changed since mid-point?</a:t>
-            </a:r>
-          </a:p>
-          <a:p>
-            <a:pPr lvl="1"/>
-            <a:r>
-              <a:rPr lang="en-US" dirty="0" smtClean="0"/>
-              <a:t>Tasks</a:t>
-            </a:r>
-            <a:endParaRPr lang="en-US" dirty="0"/>
-          </a:p>
-          <a:p>
-            <a:pPr lvl="1"/>
-            <a:endParaRPr lang="en-US" dirty="0" smtClean="0"/>
-          </a:p>
-        </p:txBody>
-      </p:sp>
-      <p:sp>
-        <p:nvSpPr>
-          <p:cNvPr id="3" name="Title 2"/>
-          <p:cNvSpPr>
-            <a:spLocks noGrp="1"/>
-          </p:cNvSpPr>
-          <p:nvPr>
-            <p:ph type="title"/>
-          </p:nvPr>
-        </p:nvSpPr>
-        <p:spPr/>
+        <p:spPr>
+          <a:xfrm>
+            <a:off x="0" y="2028245"/>
+            <a:ext cx="10972800" cy="4389120"/>
+          </a:xfrm>
+        </p:spPr>
         <p:txBody>
           <a:bodyPr/>
           <a:lstStyle/>
           <a:p>
-            <a:r>
-              <a:rPr lang="en-US" dirty="0" smtClean="0"/>
-              <a:t>Summary</a:t>
-            </a:r>
+            <a:pPr marL="0" indent="0">
+              <a:buNone/>
+            </a:pPr>
             <a:endParaRPr lang="en-US" dirty="0"/>
           </a:p>
-        </p:txBody>
-      </p:sp>
-      <p:pic>
-        <p:nvPicPr>
-          <p:cNvPr id="4" name="Picture 3"/>
-          <p:cNvPicPr>
-            <a:picLocks noChangeAspect="1"/>
-          </p:cNvPicPr>
-          <p:nvPr/>
-        </p:nvPicPr>
-        <p:blipFill>
-          <a:blip r:embed="rId2">
-            <a:extLst>
-              <a:ext uri="{28A0092B-C50C-407E-A947-70E740481C1C}">
-                <a14:useLocalDpi xmlns:a14="http://schemas.microsoft.com/office/drawing/2010/main" val="0"/>
-              </a:ext>
-            </a:extLst>
-          </a:blip>
-          <a:stretch>
-            <a:fillRect/>
-          </a:stretch>
-        </p:blipFill>
-        <p:spPr>
-          <a:xfrm>
-            <a:off x="6650380" y="2753677"/>
-            <a:ext cx="4048125" cy="2752725"/>
-          </a:xfrm>
-          <a:prstGeom prst="rect">
-            <a:avLst/>
-          </a:prstGeom>
-        </p:spPr>
-      </p:pic>
-      <p:sp>
-        <p:nvSpPr>
-          <p:cNvPr id="5" name="TextBox 4"/>
-          <p:cNvSpPr txBox="1"/>
-          <p:nvPr/>
-        </p:nvSpPr>
-        <p:spPr>
-          <a:xfrm>
-            <a:off x="8345978" y="5506402"/>
-            <a:ext cx="2909455" cy="577081"/>
-          </a:xfrm>
-          <a:prstGeom prst="rect">
-            <a:avLst/>
-          </a:prstGeom>
-          <a:noFill/>
-          <a:ln>
-            <a:solidFill>
-              <a:schemeClr val="bg2"/>
-            </a:solidFill>
-          </a:ln>
-        </p:spPr>
-        <p:txBody>
-          <a:bodyPr wrap="square" rtlCol="0">
-            <a:spAutoFit/>
-          </a:bodyPr>
+          <a:p>
+            <a:pPr lvl="1"/>
+            <a:r>
+              <a:rPr lang="en-IE" dirty="0"/>
+              <a:t>Original idea by Cedric in early 2016</a:t>
+            </a:r>
+          </a:p>
+          <a:p>
+            <a:pPr lvl="1"/>
+            <a:r>
+              <a:rPr lang="en-IE" dirty="0"/>
+              <a:t>Website development with Keith in late 2016</a:t>
+            </a:r>
+          </a:p>
+          <a:p>
+            <a:pPr lvl="1"/>
+            <a:r>
+              <a:rPr lang="en-IE" dirty="0"/>
+              <a:t>Group decision to make it into an Android app.</a:t>
+            </a:r>
+          </a:p>
+          <a:p>
+            <a:pPr lvl="1"/>
+            <a:endParaRPr lang="en-IE" dirty="0"/>
+          </a:p>
+          <a:p>
+            <a:pPr lvl="1"/>
+            <a:endParaRPr lang="en-US" dirty="0"/>
+          </a:p>
+          <a:p>
+            <a:endParaRPr lang="en-US" dirty="0"/>
+          </a:p>
+        </p:txBody>
+      </p:sp>
+      <p:sp>
+        <p:nvSpPr>
+          <p:cNvPr id="3" name="Title 2"/>
+          <p:cNvSpPr>
+            <a:spLocks noGrp="1"/>
+          </p:cNvSpPr>
+          <p:nvPr>
+            <p:ph type="title"/>
+          </p:nvPr>
+        </p:nvSpPr>
+        <p:spPr/>
+        <p:txBody>
+          <a:bodyPr/>
           <a:lstStyle/>
           <a:p>
             <a:r>
-              <a:rPr lang="en-IE" sz="1050" dirty="0"/>
-              <a:t>http://blog.radardaproducao.com.br/procult/10642/gestao-de-projetos-aplicada-a-producao-cultural-2/</a:t>
-            </a:r>
-            <a:endParaRPr lang="en-IE" sz="1050" dirty="0" smtClean="0"/>
+              <a:rPr lang="en-IE" dirty="0"/>
+              <a:t>I</a:t>
+            </a:r>
+            <a:r>
+              <a:rPr lang="en-US" dirty="0" err="1"/>
+              <a:t>dea</a:t>
+            </a:r>
+            <a:r>
+              <a:rPr lang="en-US" dirty="0"/>
+              <a:t> of Audio Acoustic Assistant</a:t>
+            </a:r>
           </a:p>
         </p:txBody>
       </p:sp>
@@ -5039,13 +4966,6 @@
       </p:transition>
     </mc:Fallback>
   </mc:AlternateContent>
-  <p:timing>
-    <p:tnLst>
-      <p:par>
-        <p:cTn id="1" dur="indefinite" restart="never" nodeType="tmRoot"/>
-      </p:par>
-    </p:tnLst>
-  </p:timing>
 </p:sld>
 </file>
 
@@ -5078,86 +4998,99 @@
         </p:nvSpPr>
         <p:spPr/>
         <p:txBody>
-          <a:bodyPr>
-            <a:normAutofit lnSpcReduction="10000"/>
-          </a:bodyPr>
+          <a:bodyPr/>
           <a:lstStyle/>
           <a:p>
             <a:r>
-              <a:rPr lang="en-IE" dirty="0" smtClean="0"/>
-              <a:t>Purpose of the app is to get the amount of acoustic foam a user needs</a:t>
-            </a:r>
-          </a:p>
-          <a:p>
-            <a:r>
-              <a:rPr lang="en-IE" dirty="0" smtClean="0"/>
-              <a:t>Sign-up or login </a:t>
+              <a:rPr lang="en-US" dirty="0"/>
+              <a:t>Android Studio</a:t>
             </a:r>
           </a:p>
           <a:p>
             <a:pPr lvl="1"/>
             <a:r>
-              <a:rPr lang="en-IE" dirty="0" smtClean="0"/>
-              <a:t>Integrated Google sign in and Facebook login. </a:t>
+              <a:rPr lang="en-IE" dirty="0"/>
+              <a:t>A</a:t>
+            </a:r>
+            <a:r>
+              <a:rPr lang="en-US" dirty="0" err="1"/>
+              <a:t>ndroid</a:t>
+            </a:r>
+            <a:r>
+              <a:rPr lang="en-US" dirty="0"/>
+              <a:t> Software Development Kit (SDK)</a:t>
             </a:r>
           </a:p>
           <a:p>
             <a:pPr lvl="1"/>
             <a:r>
-              <a:rPr lang="en-IE" dirty="0" smtClean="0"/>
-              <a:t>Data saved to database</a:t>
-            </a:r>
-          </a:p>
-          <a:p>
-            <a:pPr lvl="2"/>
-            <a:r>
-              <a:rPr lang="en-IE" dirty="0" smtClean="0"/>
-              <a:t>Potential use:</a:t>
-            </a:r>
-          </a:p>
-          <a:p>
-            <a:pPr lvl="3"/>
-            <a:r>
-              <a:rPr lang="en-IE" dirty="0" smtClean="0"/>
-              <a:t>Mailing list</a:t>
-            </a:r>
-          </a:p>
-          <a:p>
-            <a:pPr lvl="3"/>
-            <a:r>
-              <a:rPr lang="en-IE" dirty="0" smtClean="0"/>
-              <a:t>Website of different locations and saved results.</a:t>
-            </a:r>
-          </a:p>
-          <a:p>
-            <a:pPr marL="978408" lvl="3" indent="0">
-              <a:buNone/>
-            </a:pPr>
-            <a:endParaRPr lang="en-IE" dirty="0" smtClean="0"/>
-          </a:p>
-          <a:p>
-            <a:r>
-              <a:rPr lang="en-IE" dirty="0" smtClean="0"/>
-              <a:t>User selection</a:t>
-            </a:r>
+              <a:rPr lang="en-IE" dirty="0"/>
+              <a:t>Java IDE</a:t>
+            </a:r>
+            <a:endParaRPr lang="en-US" dirty="0"/>
           </a:p>
           <a:p>
             <a:pPr lvl="1"/>
             <a:r>
-              <a:rPr lang="en-IE" dirty="0" smtClean="0"/>
-              <a:t>YouTuber, home artist, event organiser</a:t>
-            </a:r>
-          </a:p>
-          <a:p>
-            <a:pPr lvl="2"/>
-            <a:r>
-              <a:rPr lang="en-IE" dirty="0" smtClean="0"/>
-              <a:t>Boolean value saved, and start of result calculation</a:t>
+              <a:rPr lang="en-IE" dirty="0"/>
+              <a:t>J</a:t>
+            </a:r>
+            <a:r>
+              <a:rPr lang="en-US" dirty="0"/>
+              <a:t>ava – Coding for different Intents (Pages)</a:t>
             </a:r>
           </a:p>
           <a:p>
             <a:pPr lvl="1"/>
-            <a:endParaRPr lang="en-IE" dirty="0"/>
+            <a:r>
+              <a:rPr lang="en-IE" dirty="0"/>
+              <a:t>C</a:t>
+            </a:r>
+            <a:r>
+              <a:rPr lang="en-US" dirty="0"/>
+              <a:t>++ – Implemented into the Java coding </a:t>
+            </a:r>
+          </a:p>
+          <a:p>
+            <a:pPr lvl="1"/>
+            <a:r>
+              <a:rPr lang="en-IE" dirty="0"/>
+              <a:t>X</a:t>
+            </a:r>
+            <a:r>
+              <a:rPr lang="en-US" dirty="0"/>
+              <a:t>ML – layouts, etc. </a:t>
+            </a:r>
+          </a:p>
+          <a:p>
+            <a:r>
+              <a:rPr lang="en-IE" dirty="0"/>
+              <a:t>S</a:t>
+            </a:r>
+            <a:r>
+              <a:rPr lang="en-US" dirty="0"/>
+              <a:t>QL – storing login information</a:t>
+            </a:r>
+          </a:p>
+          <a:p>
+            <a:r>
+              <a:rPr lang="en-IE" dirty="0"/>
+              <a:t>P</a:t>
+            </a:r>
+            <a:r>
+              <a:rPr lang="en-US" dirty="0"/>
+              <a:t>HP – Sends data from app to database</a:t>
+            </a:r>
+          </a:p>
+          <a:p>
+            <a:r>
+              <a:rPr lang="en-IE" dirty="0"/>
+              <a:t>J</a:t>
+            </a:r>
+            <a:r>
+              <a:rPr lang="en-US" dirty="0"/>
+              <a:t>SON – Bridges Java and PHP together</a:t>
+            </a:r>
           </a:p>
         </p:txBody>
       </p:sp>
@@ -5173,16 +5106,13 @@
         </p:nvSpPr>
         <p:spPr/>
         <p:txBody>
-          <a:bodyPr>
-            <a:normAutofit/>
-          </a:bodyPr>
+          <a:bodyPr/>
           <a:lstStyle/>
           <a:p>
             <a:r>
-              <a:rPr lang="en-US" dirty="0" smtClean="0"/>
-              <a:t>Breakdown of app</a:t>
-            </a:r>
-            <a:endParaRPr lang="en-US" dirty="0"/>
+              <a:rPr lang="en-US" dirty="0"/>
+              <a:t>Technologies used</a:t>
+            </a:r>
           </a:p>
         </p:txBody>
       </p:sp>
@@ -5208,13 +5138,6 @@
       </p:transition>
     </mc:Fallback>
   </mc:AlternateContent>
-  <p:timing>
-    <p:tnLst>
-      <p:par>
-        <p:cTn id="1" dur="indefinite" restart="never" nodeType="tmRoot"/>
-      </p:par>
-    </p:tnLst>
-  </p:timing>
 </p:sld>
 </file>
 
@@ -5251,58 +5174,66 @@
           <a:lstStyle/>
           <a:p>
             <a:r>
-              <a:rPr lang="en-IE" dirty="0" smtClean="0"/>
-              <a:t>Area calculator</a:t>
+              <a:rPr lang="en-US" dirty="0"/>
+              <a:t>Android Studio not working </a:t>
             </a:r>
           </a:p>
           <a:p>
             <a:pPr lvl="1"/>
             <a:r>
-              <a:rPr lang="en-IE" dirty="0" smtClean="0"/>
-              <a:t>Enter values in either feet or metres</a:t>
+              <a:rPr lang="en-IE" dirty="0"/>
+              <a:t>I</a:t>
+            </a:r>
+            <a:r>
+              <a:rPr lang="en-US" dirty="0"/>
+              <a:t>T Support / fixes</a:t>
             </a:r>
           </a:p>
           <a:p>
             <a:pPr lvl="1"/>
             <a:r>
-              <a:rPr lang="en-IE" dirty="0" smtClean="0"/>
-              <a:t>Button text changes depending on which radio button selected</a:t>
-            </a:r>
-            <a:endParaRPr lang="en-IE" dirty="0"/>
+              <a:rPr lang="en-IE" dirty="0"/>
+              <a:t>E</a:t>
+            </a:r>
+            <a:r>
+              <a:rPr lang="en-US" dirty="0" err="1"/>
+              <a:t>xternal</a:t>
+            </a:r>
+            <a:r>
+              <a:rPr lang="en-US" dirty="0"/>
+              <a:t> emulator issues</a:t>
+            </a:r>
+          </a:p>
+          <a:p>
+            <a:r>
+              <a:rPr lang="en-IE" dirty="0"/>
+              <a:t>Communication issues</a:t>
+            </a:r>
           </a:p>
           <a:p>
             <a:pPr lvl="1"/>
             <a:r>
-              <a:rPr lang="en-IE" dirty="0" smtClean="0"/>
-              <a:t>Result in both metres and feet</a:t>
-            </a:r>
-          </a:p>
-          <a:p>
-            <a:pPr marL="393192" lvl="1" indent="0">
-              <a:buNone/>
-            </a:pPr>
-            <a:endParaRPr lang="en-IE" dirty="0" smtClean="0"/>
-          </a:p>
-          <a:p>
-            <a:r>
-              <a:rPr lang="en-IE" dirty="0" smtClean="0"/>
-              <a:t>Room Selection</a:t>
+              <a:rPr lang="en-IE" dirty="0"/>
+              <a:t>Team members working on their own and not communicating</a:t>
             </a:r>
           </a:p>
           <a:p>
             <a:pPr lvl="1"/>
             <a:r>
-              <a:rPr lang="en-IE" dirty="0" smtClean="0"/>
-              <a:t>Select if Bedroom or Empty Room </a:t>
-            </a:r>
-          </a:p>
-          <a:p>
-            <a:pPr lvl="2"/>
-            <a:r>
-              <a:rPr lang="en-IE" dirty="0" smtClean="0"/>
-              <a:t>Values from user selection brought to this intent (page)</a:t>
-            </a:r>
-            <a:endParaRPr lang="en-IE" dirty="0"/>
+              <a:rPr lang="en-IE" dirty="0"/>
+              <a:t>Working ahead</a:t>
+            </a:r>
+          </a:p>
+          <a:p>
+            <a:pPr lvl="1"/>
+            <a:r>
+              <a:rPr lang="en-IE" dirty="0"/>
+              <a:t>Working with more than one Android Studio Projects</a:t>
+            </a:r>
+          </a:p>
+          <a:p>
+            <a:pPr lvl="1"/>
+            <a:endParaRPr lang="en-US" dirty="0"/>
           </a:p>
         </p:txBody>
       </p:sp>
@@ -5323,13 +5254,8 @@
           <a:p>
             <a:r>
               <a:rPr lang="en-US" dirty="0"/>
-              <a:t>Breakdown of </a:t>
-            </a:r>
-            <a:r>
-              <a:rPr lang="en-US" dirty="0" smtClean="0"/>
-              <a:t>app (continued)</a:t>
-            </a:r>
-            <a:endParaRPr lang="en-US" dirty="0"/>
+              <a:t>Challenges</a:t>
+            </a:r>
           </a:p>
         </p:txBody>
       </p:sp>
@@ -5355,13 +5281,6 @@
       </p:transition>
     </mc:Fallback>
   </mc:AlternateContent>
-  <p:timing>
-    <p:tnLst>
-      <p:par>
-        <p:cTn id="1" dur="indefinite" restart="never" nodeType="tmRoot"/>
-      </p:par>
-    </p:tnLst>
-  </p:timing>
 </p:sld>
 </file>
 
@@ -5394,77 +5313,81 @@
         </p:nvSpPr>
         <p:spPr/>
         <p:txBody>
-          <a:bodyPr>
-            <a:normAutofit/>
-          </a:bodyPr>
-          <a:lstStyle/>
-          <a:p>
-            <a:r>
-              <a:rPr lang="en-IE" dirty="0" smtClean="0"/>
-              <a:t>Measuring Intent</a:t>
-            </a:r>
-          </a:p>
-          <a:p>
-            <a:pPr lvl="1"/>
-            <a:r>
-              <a:rPr lang="en-IE" dirty="0" smtClean="0"/>
-              <a:t>Next button hidden until complete</a:t>
-            </a:r>
-          </a:p>
-          <a:p>
-            <a:pPr lvl="1"/>
-            <a:r>
-              <a:rPr lang="en-IE" dirty="0" smtClean="0"/>
-              <a:t>Record from device’s microphone to get decibel (dB) value</a:t>
-            </a:r>
-          </a:p>
-          <a:p>
-            <a:pPr lvl="1"/>
-            <a:r>
-              <a:rPr lang="en-IE" dirty="0" err="1" smtClean="0"/>
-              <a:t>TextView</a:t>
-            </a:r>
-            <a:r>
-              <a:rPr lang="en-IE" dirty="0" smtClean="0"/>
-              <a:t> shows result.</a:t>
-            </a:r>
-          </a:p>
-          <a:p>
-            <a:pPr lvl="1"/>
-            <a:r>
-              <a:rPr lang="en-IE" dirty="0" smtClean="0"/>
-              <a:t>Toast message saying “Calculating…” when Next button tapped</a:t>
-            </a:r>
-          </a:p>
-          <a:p>
-            <a:pPr lvl="1"/>
-            <a:r>
-              <a:rPr lang="en-IE" dirty="0" smtClean="0"/>
-              <a:t>Original idea had a changing dB value while measuring, was to get average as the final dB value</a:t>
-            </a:r>
-          </a:p>
-        </p:txBody>
-      </p:sp>
-      <p:sp>
-        <p:nvSpPr>
-          <p:cNvPr id="3" name="Title 2"/>
-          <p:cNvSpPr>
-            <a:spLocks noGrp="1"/>
-          </p:cNvSpPr>
-          <p:nvPr>
-            <p:ph type="title"/>
-          </p:nvPr>
-        </p:nvSpPr>
-        <p:spPr/>
-        <p:txBody>
           <a:bodyPr/>
           <a:lstStyle/>
           <a:p>
             <a:r>
-              <a:rPr lang="en-US" dirty="0" smtClean="0"/>
-              <a:t>Breakdown of app (continued)</a:t>
-            </a:r>
+              <a:rPr lang="en-IE" dirty="0"/>
+              <a:t>Overall look was a bit shabby</a:t>
+            </a:r>
+          </a:p>
+          <a:p>
+            <a:pPr lvl="1"/>
+            <a:r>
+              <a:rPr lang="en-IE" dirty="0"/>
+              <a:t>Removed background images</a:t>
+            </a:r>
+          </a:p>
+          <a:p>
+            <a:pPr lvl="1"/>
+            <a:r>
+              <a:rPr lang="en-IE" dirty="0"/>
+              <a:t>Tidied up app (aesthetics)</a:t>
+            </a:r>
+          </a:p>
+          <a:p>
+            <a:pPr marL="393192" lvl="1" indent="0">
+              <a:buNone/>
+            </a:pPr>
+            <a:endParaRPr lang="en-IE" dirty="0"/>
+          </a:p>
+          <a:p>
+            <a:r>
+              <a:rPr lang="en-IE" dirty="0"/>
+              <a:t>Lacked functional capability</a:t>
+            </a:r>
+          </a:p>
+          <a:p>
+            <a:pPr lvl="1"/>
+            <a:r>
+              <a:rPr lang="en-IE" dirty="0"/>
+              <a:t>Tested app to ensure everything working</a:t>
+            </a:r>
+          </a:p>
+          <a:p>
+            <a:pPr lvl="1"/>
+            <a:endParaRPr lang="en-IE" dirty="0"/>
+          </a:p>
+          <a:p>
+            <a:endParaRPr lang="en-IE" dirty="0"/>
+          </a:p>
+          <a:p>
+            <a:pPr marL="0" indent="0">
+              <a:buNone/>
+            </a:pPr>
             <a:endParaRPr lang="en-US" dirty="0"/>
+          </a:p>
+        </p:txBody>
+      </p:sp>
+      <p:sp>
+        <p:nvSpPr>
+          <p:cNvPr id="3" name="Title 2"/>
+          <p:cNvSpPr>
+            <a:spLocks noGrp="1"/>
+          </p:cNvSpPr>
+          <p:nvPr>
+            <p:ph type="title"/>
+          </p:nvPr>
+        </p:nvSpPr>
+        <p:spPr/>
+        <p:txBody>
+          <a:bodyPr/>
+          <a:lstStyle/>
+          <a:p>
+            <a:r>
+              <a:rPr lang="en-US" dirty="0"/>
+              <a:t>Mid-point presentation feedback</a:t>
+            </a:r>
           </a:p>
         </p:txBody>
       </p:sp>
@@ -5490,13 +5413,6 @@
       </p:transition>
     </mc:Fallback>
   </mc:AlternateContent>
-  <p:timing>
-    <p:tnLst>
-      <p:par>
-        <p:cTn id="1" dur="indefinite" restart="never" nodeType="tmRoot"/>
-      </p:par>
-    </p:tnLst>
-  </p:timing>
 </p:sld>
 </file>
 
@@ -5519,97 +5435,60 @@
       </p:grpSpPr>
       <p:sp>
         <p:nvSpPr>
-          <p:cNvPr id="2" name="Content Placeholder 1"/>
-          <p:cNvSpPr>
-            <a:spLocks noGrp="1"/>
-          </p:cNvSpPr>
-          <p:nvPr>
-            <p:ph idx="1"/>
-          </p:nvPr>
-        </p:nvSpPr>
-        <p:spPr/>
-        <p:txBody>
-          <a:bodyPr/>
+          <p:cNvPr id="3" name="Title 2"/>
+          <p:cNvSpPr>
+            <a:spLocks noGrp="1"/>
+          </p:cNvSpPr>
+          <p:nvPr>
+            <p:ph type="title"/>
+          </p:nvPr>
+        </p:nvSpPr>
+        <p:spPr>
+          <a:xfrm>
+            <a:off x="437322" y="0"/>
+            <a:ext cx="11039061" cy="1762539"/>
+          </a:xfrm>
+        </p:spPr>
+        <p:txBody>
+          <a:bodyPr>
+            <a:normAutofit/>
+          </a:bodyPr>
           <a:lstStyle/>
           <a:p>
             <a:r>
-              <a:rPr lang="en-IE" dirty="0"/>
-              <a:t>Result Intent</a:t>
-            </a:r>
-          </a:p>
-          <a:p>
-            <a:pPr lvl="1"/>
-            <a:r>
-              <a:rPr lang="en-IE" dirty="0"/>
-              <a:t>Customised result message and amount of acoustic foam needed in metres </a:t>
-            </a:r>
-            <a:r>
-              <a:rPr lang="en-IE" dirty="0" smtClean="0"/>
-              <a:t>squared depending on inputs</a:t>
-            </a:r>
-            <a:endParaRPr lang="en-IE" dirty="0"/>
-          </a:p>
-          <a:p>
-            <a:pPr lvl="1"/>
-            <a:r>
-              <a:rPr lang="en-IE" dirty="0"/>
-              <a:t>Image link to store (currently to Amazon)</a:t>
-            </a:r>
-          </a:p>
-          <a:p>
-            <a:pPr lvl="1"/>
-            <a:r>
-              <a:rPr lang="en-IE" dirty="0"/>
-              <a:t>Facebook </a:t>
-            </a:r>
-            <a:r>
-              <a:rPr lang="en-IE" dirty="0" smtClean="0"/>
-              <a:t>Page link.</a:t>
-            </a:r>
-          </a:p>
-          <a:p>
-            <a:pPr lvl="2"/>
-            <a:r>
-              <a:rPr lang="en-IE" dirty="0" smtClean="0"/>
-              <a:t>Opens </a:t>
-            </a:r>
-            <a:r>
-              <a:rPr lang="en-IE" dirty="0"/>
-              <a:t>in Facebook app if </a:t>
-            </a:r>
-            <a:r>
-              <a:rPr lang="en-IE" dirty="0" smtClean="0"/>
-              <a:t>installed</a:t>
-            </a:r>
-          </a:p>
-          <a:p>
-            <a:pPr lvl="2"/>
-            <a:r>
-              <a:rPr lang="en-IE" dirty="0" smtClean="0"/>
-              <a:t>Opens in default browser if Facebook app not installed</a:t>
-            </a:r>
-            <a:endParaRPr lang="en-IE" dirty="0"/>
-          </a:p>
-        </p:txBody>
-      </p:sp>
-      <p:sp>
-        <p:nvSpPr>
-          <p:cNvPr id="3" name="Title 2"/>
-          <p:cNvSpPr>
-            <a:spLocks noGrp="1"/>
-          </p:cNvSpPr>
-          <p:nvPr>
-            <p:ph type="title"/>
-          </p:nvPr>
-        </p:nvSpPr>
-        <p:spPr/>
-        <p:txBody>
-          <a:bodyPr/>
+              <a:rPr lang="en-US" dirty="0"/>
+              <a:t>Online collaboration</a:t>
+            </a:r>
+          </a:p>
+        </p:txBody>
+      </p:sp>
+      <p:sp>
+        <p:nvSpPr>
+          <p:cNvPr id="8" name="Rectangle 7"/>
+          <p:cNvSpPr/>
+          <p:nvPr/>
+        </p:nvSpPr>
+        <p:spPr>
+          <a:xfrm>
+            <a:off x="2239616" y="3101009"/>
+            <a:ext cx="7686261" cy="369332"/>
+          </a:xfrm>
+          <a:prstGeom prst="rect">
+            <a:avLst/>
+          </a:prstGeom>
+        </p:spPr>
+        <p:txBody>
+          <a:bodyPr wrap="square">
+            <a:spAutoFit/>
+          </a:bodyPr>
           <a:lstStyle/>
           <a:p>
-            <a:r>
-              <a:rPr lang="en-US" dirty="0" smtClean="0"/>
-              <a:t>Breakdown of app (continued)</a:t>
+            <a:pPr algn="ctr"/>
+            <a:r>
+              <a:rPr lang="en-US" dirty="0">
+                <a:hlinkClick r:id="rId2"/>
+              </a:rPr>
+              <a:t>https://github.com/CedricVz/AAA/commits/master</a:t>
             </a:r>
             <a:endParaRPr lang="en-US" dirty="0"/>
           </a:p>
@@ -5637,343 +5516,6 @@
       </p:transition>
     </mc:Fallback>
   </mc:AlternateContent>
-  <p:timing>
-    <p:tnLst>
-      <p:par>
-        <p:cTn id="1" dur="indefinite" restart="never" nodeType="tmRoot"/>
-      </p:par>
-    </p:tnLst>
-  </p:timing>
-</p:sld>
-</file>
-
-<file path=ppt/slides/slide7.xml><?xml version="1.0" encoding="utf-8"?>
-<p:sld xmlns:a="http://schemas.openxmlformats.org/drawingml/2006/main" xmlns:r="http://schemas.openxmlformats.org/officeDocument/2006/relationships" xmlns:p="http://schemas.openxmlformats.org/presentationml/2006/main">
-  <p:cSld>
-    <p:spTree>
-      <p:nvGrpSpPr>
-        <p:cNvPr id="1" name=""/>
-        <p:cNvGrpSpPr/>
-        <p:nvPr/>
-      </p:nvGrpSpPr>
-      <p:grpSpPr>
-        <a:xfrm>
-          <a:off x="0" y="0"/>
-          <a:ext cx="0" cy="0"/>
-          <a:chOff x="0" y="0"/>
-          <a:chExt cx="0" cy="0"/>
-        </a:xfrm>
-      </p:grpSpPr>
-      <p:sp>
-        <p:nvSpPr>
-          <p:cNvPr id="2" name="Content Placeholder 1"/>
-          <p:cNvSpPr>
-            <a:spLocks noGrp="1"/>
-          </p:cNvSpPr>
-          <p:nvPr>
-            <p:ph idx="1"/>
-          </p:nvPr>
-        </p:nvSpPr>
-        <p:spPr/>
-        <p:txBody>
-          <a:bodyPr>
-            <a:normAutofit lnSpcReduction="10000"/>
-          </a:bodyPr>
-          <a:lstStyle/>
-          <a:p>
-            <a:r>
-              <a:rPr lang="en-US" dirty="0" smtClean="0"/>
-              <a:t>Android Studio issues</a:t>
-            </a:r>
-          </a:p>
-          <a:p>
-            <a:pPr lvl="1"/>
-            <a:r>
-              <a:rPr lang="en-US" dirty="0" smtClean="0"/>
-              <a:t>New technology</a:t>
-            </a:r>
-          </a:p>
-          <a:p>
-            <a:pPr lvl="1"/>
-            <a:r>
-              <a:rPr lang="en-US" dirty="0" smtClean="0"/>
-              <a:t>Android Studio application issues</a:t>
-            </a:r>
-          </a:p>
-          <a:p>
-            <a:pPr marL="393192" lvl="1" indent="0">
-              <a:buNone/>
-            </a:pPr>
-            <a:endParaRPr lang="en-US" dirty="0" smtClean="0"/>
-          </a:p>
-          <a:p>
-            <a:r>
-              <a:rPr lang="en-US" dirty="0" smtClean="0"/>
-              <a:t>Working from multiple Android Studio Projects</a:t>
-            </a:r>
-          </a:p>
-          <a:p>
-            <a:pPr lvl="1"/>
-            <a:r>
-              <a:rPr lang="en-US" dirty="0" smtClean="0"/>
-              <a:t>Difficult to combine / control</a:t>
-            </a:r>
-          </a:p>
-          <a:p>
-            <a:pPr marL="393192" lvl="1" indent="0">
-              <a:buNone/>
-            </a:pPr>
-            <a:endParaRPr lang="en-US" dirty="0" smtClean="0"/>
-          </a:p>
-          <a:p>
-            <a:r>
-              <a:rPr lang="en-US" dirty="0" smtClean="0"/>
-              <a:t>Original idea changed throughout</a:t>
-            </a:r>
-          </a:p>
-          <a:p>
-            <a:pPr lvl="1"/>
-            <a:r>
-              <a:rPr lang="en-US" dirty="0" smtClean="0"/>
-              <a:t>Couldn’t get Measuring Intent working correctly, used a static result</a:t>
-            </a:r>
-          </a:p>
-          <a:p>
-            <a:pPr lvl="1"/>
-            <a:r>
-              <a:rPr lang="en-US" dirty="0" smtClean="0"/>
-              <a:t>Original idea had many products on Result Intent, not possible at this time</a:t>
-            </a:r>
-            <a:endParaRPr lang="en-US" dirty="0"/>
-          </a:p>
-        </p:txBody>
-      </p:sp>
-      <p:sp>
-        <p:nvSpPr>
-          <p:cNvPr id="3" name="Title 2"/>
-          <p:cNvSpPr>
-            <a:spLocks noGrp="1"/>
-          </p:cNvSpPr>
-          <p:nvPr>
-            <p:ph type="title"/>
-          </p:nvPr>
-        </p:nvSpPr>
-        <p:spPr/>
-        <p:txBody>
-          <a:bodyPr/>
-          <a:lstStyle/>
-          <a:p>
-            <a:r>
-              <a:rPr lang="en-US" dirty="0" smtClean="0"/>
-              <a:t>Teething Problems and snags</a:t>
-            </a:r>
-            <a:endParaRPr lang="en-US" dirty="0"/>
-          </a:p>
-        </p:txBody>
-      </p:sp>
-    </p:spTree>
-    <p:extLst>
-      <p:ext uri="{BB962C8B-B14F-4D97-AF65-F5344CB8AC3E}">
-        <p14:creationId xmlns:p14="http://schemas.microsoft.com/office/powerpoint/2010/main" val="2054880847"/>
-      </p:ext>
-    </p:extLst>
-  </p:cSld>
-  <p:clrMapOvr>
-    <a:masterClrMapping/>
-  </p:clrMapOvr>
-  <mc:AlternateContent xmlns:mc="http://schemas.openxmlformats.org/markup-compatibility/2006" xmlns:p14="http://schemas.microsoft.com/office/powerpoint/2010/main">
-    <mc:Choice Requires="p14">
-      <p:transition spd="med" p14:dur="700">
-        <p:fade/>
-      </p:transition>
-    </mc:Choice>
-    <mc:Fallback xmlns="">
-      <p:transition spd="med">
-        <p:fade/>
-      </p:transition>
-    </mc:Fallback>
-  </mc:AlternateContent>
-  <p:timing>
-    <p:tnLst>
-      <p:par>
-        <p:cTn id="1" dur="indefinite" restart="never" nodeType="tmRoot"/>
-      </p:par>
-    </p:tnLst>
-  </p:timing>
-</p:sld>
-</file>
-
-<file path=ppt/slides/slide8.xml><?xml version="1.0" encoding="utf-8"?>
-<p:sld xmlns:a="http://schemas.openxmlformats.org/drawingml/2006/main" xmlns:r="http://schemas.openxmlformats.org/officeDocument/2006/relationships" xmlns:p="http://schemas.openxmlformats.org/presentationml/2006/main">
-  <p:cSld>
-    <p:spTree>
-      <p:nvGrpSpPr>
-        <p:cNvPr id="1" name=""/>
-        <p:cNvGrpSpPr/>
-        <p:nvPr/>
-      </p:nvGrpSpPr>
-      <p:grpSpPr>
-        <a:xfrm>
-          <a:off x="0" y="0"/>
-          <a:ext cx="0" cy="0"/>
-          <a:chOff x="0" y="0"/>
-          <a:chExt cx="0" cy="0"/>
-        </a:xfrm>
-      </p:grpSpPr>
-      <p:sp>
-        <p:nvSpPr>
-          <p:cNvPr id="2" name="Content Placeholder 1"/>
-          <p:cNvSpPr>
-            <a:spLocks noGrp="1"/>
-          </p:cNvSpPr>
-          <p:nvPr>
-            <p:ph idx="1"/>
-          </p:nvPr>
-        </p:nvSpPr>
-        <p:spPr/>
-        <p:txBody>
-          <a:bodyPr>
-            <a:normAutofit fontScale="77500" lnSpcReduction="20000"/>
-          </a:bodyPr>
-          <a:lstStyle/>
-          <a:p>
-            <a:r>
-              <a:rPr lang="en-US" dirty="0" smtClean="0"/>
-              <a:t>GPS / Camera</a:t>
-            </a:r>
-          </a:p>
-          <a:p>
-            <a:pPr lvl="1"/>
-            <a:r>
-              <a:rPr lang="en-US" dirty="0" smtClean="0"/>
-              <a:t>GPS could be used for location. Camera could determine size of room</a:t>
-            </a:r>
-          </a:p>
-          <a:p>
-            <a:pPr marL="393192" lvl="1" indent="0">
-              <a:buNone/>
-            </a:pPr>
-            <a:endParaRPr lang="en-US" dirty="0" smtClean="0"/>
-          </a:p>
-          <a:p>
-            <a:r>
-              <a:rPr lang="en-US" dirty="0" smtClean="0"/>
-              <a:t>Virtual Reality </a:t>
-            </a:r>
-          </a:p>
-          <a:p>
-            <a:pPr lvl="1"/>
-            <a:r>
-              <a:rPr lang="en-US" dirty="0" smtClean="0"/>
-              <a:t>A virtual reality headset could be used to determine the size of a room as user pans around.</a:t>
-            </a:r>
-          </a:p>
-          <a:p>
-            <a:pPr lvl="1"/>
-            <a:endParaRPr lang="en-US" dirty="0"/>
-          </a:p>
-          <a:p>
-            <a:r>
-              <a:rPr lang="en-US" dirty="0" smtClean="0"/>
-              <a:t>Radio equipment</a:t>
-            </a:r>
-          </a:p>
-          <a:p>
-            <a:pPr lvl="1"/>
-            <a:r>
-              <a:rPr lang="en-US" dirty="0" smtClean="0"/>
-              <a:t>A Bluetooth microphone could be used instead if device’s microphone.</a:t>
-            </a:r>
-          </a:p>
-          <a:p>
-            <a:pPr lvl="1"/>
-            <a:endParaRPr lang="en-US" dirty="0"/>
-          </a:p>
-          <a:p>
-            <a:r>
-              <a:rPr lang="en-US" dirty="0" smtClean="0"/>
-              <a:t>Link equipment</a:t>
-            </a:r>
-          </a:p>
-          <a:p>
-            <a:pPr lvl="1"/>
-            <a:r>
-              <a:rPr lang="en-US" dirty="0" smtClean="0"/>
-              <a:t>Bluetooth or Wi-Fi could be used to connect (e.g.) a home artist’s drum set.</a:t>
-            </a:r>
-          </a:p>
-          <a:p>
-            <a:pPr lvl="1"/>
-            <a:endParaRPr lang="en-US" dirty="0"/>
-          </a:p>
-          <a:p>
-            <a:r>
-              <a:rPr lang="en-US" dirty="0" smtClean="0"/>
-              <a:t>Request a professional </a:t>
-            </a:r>
-          </a:p>
-          <a:p>
-            <a:pPr lvl="1"/>
-            <a:r>
-              <a:rPr lang="en-US" dirty="0" smtClean="0"/>
-              <a:t>If user is having trouble, they could request a professional to help with the acoustics of a room.  </a:t>
-            </a:r>
-            <a:endParaRPr lang="en-US" dirty="0"/>
-          </a:p>
-        </p:txBody>
-      </p:sp>
-      <p:sp>
-        <p:nvSpPr>
-          <p:cNvPr id="3" name="Title 2"/>
-          <p:cNvSpPr>
-            <a:spLocks noGrp="1"/>
-          </p:cNvSpPr>
-          <p:nvPr>
-            <p:ph type="title"/>
-          </p:nvPr>
-        </p:nvSpPr>
-        <p:spPr/>
-        <p:txBody>
-          <a:bodyPr/>
-          <a:lstStyle/>
-          <a:p>
-            <a:r>
-              <a:rPr lang="en-US" dirty="0" smtClean="0"/>
-              <a:t>Future development</a:t>
-            </a:r>
-            <a:endParaRPr lang="en-US" dirty="0"/>
-          </a:p>
-        </p:txBody>
-      </p:sp>
-    </p:spTree>
-    <p:extLst>
-      <p:ext uri="{BB962C8B-B14F-4D97-AF65-F5344CB8AC3E}">
-        <p14:creationId xmlns:p14="http://schemas.microsoft.com/office/powerpoint/2010/main" val="112606551"/>
-      </p:ext>
-    </p:extLst>
-  </p:cSld>
-  <p:clrMapOvr>
-    <a:masterClrMapping/>
-  </p:clrMapOvr>
-  <mc:AlternateContent xmlns:mc="http://schemas.openxmlformats.org/markup-compatibility/2006" xmlns:p14="http://schemas.microsoft.com/office/powerpoint/2010/main">
-    <mc:Choice Requires="p14">
-      <p:transition spd="med" p14:dur="700">
-        <p:fade/>
-      </p:transition>
-    </mc:Choice>
-    <mc:Fallback xmlns="">
-      <p:transition spd="med">
-        <p:fade/>
-      </p:transition>
-    </mc:Fallback>
-  </mc:AlternateContent>
-  <p:timing>
-    <p:tnLst>
-      <p:par>
-        <p:cTn id="1" dur="indefinite" restart="never" nodeType="tmRoot"/>
-      </p:par>
-    </p:tnLst>
-  </p:timing>
 </p:sld>
 </file>
 

</xml_diff>